<commit_message>
finished lsn 4 ppt
</commit_message>
<xml_diff>
--- a/notes/L4/Lsn4.pptx
+++ b/notes/L4/Lsn4.pptx
@@ -10227,8 +10227,8 @@
         </p:nvSpPr>
         <p:spPr>
           <a:xfrm>
-            <a:off x="724437" y="856445"/>
-            <a:ext cx="7772400" cy="4724400"/>
+            <a:off x="0" y="856445"/>
+            <a:ext cx="9144000" cy="4724400"/>
           </a:xfrm>
         </p:spPr>
         <p:txBody>
@@ -10263,7 +10263,11 @@
           <a:p>
             <a:r>
               <a:rPr lang="en-US" dirty="0" smtClean="0"/>
-              <a:t>PC Relative</a:t>
+              <a:t>Symbolic/PC </a:t>
+            </a:r>
+            <a:r>
+              <a:rPr lang="en-US" dirty="0" smtClean="0"/>
+              <a:t>Relative</a:t>
             </a:r>
             <a:r>
               <a:rPr lang="en-US" dirty="0"/>
@@ -10981,8 +10985,12 @@
               <a:t>_ _ _ _    _ _ </a:t>
             </a:r>
             <a:r>
-              <a:rPr lang="en-US" dirty="0" smtClean="0"/>
-              <a:t>_ _    _ _ </a:t>
+              <a:rPr lang="en-US" dirty="0" smtClean="0">
+                <a:solidFill>
+                  <a:srgbClr val="FFC000"/>
+                </a:solidFill>
+              </a:rPr>
+              <a:t>_ _    _ </a:t>
             </a:r>
             <a:r>
               <a:rPr lang="en-US" dirty="0" smtClean="0">
@@ -10990,23 +10998,15 @@
                   <a:srgbClr val="7030A0"/>
                 </a:solidFill>
               </a:rPr>
-              <a:t>_</a:t>
-            </a:r>
-            <a:r>
-              <a:rPr lang="en-US" dirty="0" smtClean="0"/>
-              <a:t> </a:t>
+              <a:t>_ </a:t>
             </a:r>
             <a:r>
               <a:rPr lang="en-US" dirty="0" smtClean="0">
                 <a:solidFill>
-                  <a:srgbClr val="0070C0"/>
+                  <a:srgbClr val="00B0F0"/>
                 </a:solidFill>
               </a:rPr>
-              <a:t>_</a:t>
-            </a:r>
-            <a:r>
-              <a:rPr lang="en-US" dirty="0" smtClean="0"/>
-              <a:t>    </a:t>
+              <a:t>_ _    </a:t>
             </a:r>
             <a:r>
               <a:rPr lang="en-US" dirty="0" smtClean="0">
@@ -11738,7 +11738,7 @@
         <p:spPr bwMode="auto">
           <a:xfrm>
             <a:off x="5902353" y="2862470"/>
-            <a:ext cx="617717" cy="1510747"/>
+            <a:ext cx="445438" cy="1510746"/>
           </a:xfrm>
           <a:prstGeom prst="straightConnector1">
             <a:avLst/>
@@ -11810,6 +11810,130 @@
           <a:effectLst/>
         </p:spPr>
       </p:cxnSp>
+      <p:sp>
+        <p:nvSpPr>
+          <p:cNvPr id="41" name="Oval 40"/>
+          <p:cNvSpPr/>
+          <p:nvPr/>
+        </p:nvSpPr>
+        <p:spPr bwMode="auto">
+          <a:xfrm>
+            <a:off x="4068417" y="2411896"/>
+            <a:ext cx="834887" cy="450574"/>
+          </a:xfrm>
+          <a:prstGeom prst="ellipse">
+            <a:avLst/>
+          </a:prstGeom>
+          <a:noFill/>
+          <a:ln w="9525" cap="flat" cmpd="sng" algn="ctr">
+            <a:solidFill>
+              <a:srgbClr val="FFC000"/>
+            </a:solidFill>
+            <a:prstDash val="solid"/>
+            <a:round/>
+            <a:headEnd type="none" w="med" len="med"/>
+            <a:tailEnd type="none" w="med" len="med"/>
+          </a:ln>
+          <a:effectLst/>
+        </p:spPr>
+        <p:txBody>
+          <a:bodyPr vert="horz" wrap="square" lIns="91440" tIns="45720" rIns="91440" bIns="45720" numCol="1" rtlCol="0" anchor="t" anchorCtr="0" compatLnSpc="1">
+            <a:prstTxWarp prst="textNoShape">
+              <a:avLst/>
+            </a:prstTxWarp>
+            <a:spAutoFit/>
+          </a:bodyPr>
+          <a:lstStyle/>
+          <a:p>
+            <a:pPr marL="0" marR="0" indent="0" algn="l" defTabSz="914400" rtl="0" eaLnBrk="1" fontAlgn="base" latinLnBrk="0" hangingPunct="1">
+              <a:lnSpc>
+                <a:spcPct val="100000"/>
+              </a:lnSpc>
+              <a:spcBef>
+                <a:spcPct val="50000"/>
+              </a:spcBef>
+              <a:spcAft>
+                <a:spcPct val="0"/>
+              </a:spcAft>
+              <a:buClrTx/>
+              <a:buSzTx/>
+              <a:buFontTx/>
+              <a:buNone/>
+              <a:tabLst/>
+            </a:pPr>
+            <a:endParaRPr kumimoji="0" lang="en-US" sz="2400" b="0" i="0" u="none" strike="noStrike" cap="none" normalizeH="0" baseline="0" smtClean="0">
+              <a:ln>
+                <a:noFill/>
+              </a:ln>
+              <a:solidFill>
+                <a:schemeClr val="tx1"/>
+              </a:solidFill>
+              <a:effectLst/>
+              <a:latin typeface="Times New Roman" pitchFamily="18" charset="0"/>
+              <a:sym typeface="Wingdings" pitchFamily="2" charset="2"/>
+            </a:endParaRPr>
+          </a:p>
+        </p:txBody>
+      </p:sp>
+      <p:cxnSp>
+        <p:nvCxnSpPr>
+          <p:cNvPr id="43" name="Straight Arrow Connector 42"/>
+          <p:cNvCxnSpPr>
+            <a:stCxn id="41" idx="3"/>
+            <a:endCxn id="1027" idx="0"/>
+          </p:cNvCxnSpPr>
+          <p:nvPr/>
+        </p:nvCxnSpPr>
+        <p:spPr bwMode="auto">
+          <a:xfrm flipH="1">
+            <a:off x="1729936" y="2796485"/>
+            <a:ext cx="2460747" cy="940628"/>
+          </a:xfrm>
+          <a:prstGeom prst="straightConnector1">
+            <a:avLst/>
+          </a:prstGeom>
+          <a:noFill/>
+          <a:ln w="9525" cap="flat" cmpd="sng" algn="ctr">
+            <a:solidFill>
+              <a:srgbClr val="FFC000"/>
+            </a:solidFill>
+            <a:prstDash val="solid"/>
+            <a:round/>
+            <a:headEnd type="none" w="med" len="med"/>
+            <a:tailEnd type="arrow"/>
+          </a:ln>
+          <a:effectLst/>
+        </p:spPr>
+      </p:cxnSp>
+      <p:cxnSp>
+        <p:nvCxnSpPr>
+          <p:cNvPr id="45" name="Straight Arrow Connector 44"/>
+          <p:cNvCxnSpPr>
+            <a:stCxn id="41" idx="4"/>
+          </p:cNvCxnSpPr>
+          <p:nvPr/>
+        </p:nvCxnSpPr>
+        <p:spPr bwMode="auto">
+          <a:xfrm>
+            <a:off x="4485861" y="2862470"/>
+            <a:ext cx="1212574" cy="1510746"/>
+          </a:xfrm>
+          <a:prstGeom prst="straightConnector1">
+            <a:avLst/>
+          </a:prstGeom>
+          <a:noFill/>
+          <a:ln w="9525" cap="flat" cmpd="sng" algn="ctr">
+            <a:solidFill>
+              <a:srgbClr val="FFC000"/>
+            </a:solidFill>
+            <a:prstDash val="solid"/>
+            <a:round/>
+            <a:headEnd type="none" w="med" len="med"/>
+            <a:tailEnd type="arrow"/>
+          </a:ln>
+          <a:effectLst/>
+        </p:spPr>
+      </p:cxnSp>
     </p:spTree>
     <p:extLst>
       <p:ext uri="{BB962C8B-B14F-4D97-AF65-F5344CB8AC3E}">
@@ -13495,13 +13619,1103 @@
           <a:lstStyle/>
           <a:p>
             <a:r>
+              <a:rPr lang="en-US" dirty="0" smtClean="0">
+                <a:solidFill>
+                  <a:srgbClr val="FF0000"/>
+                </a:solidFill>
+              </a:rPr>
+              <a:t>_ _ _ _   </a:t>
+            </a:r>
+            <a:r>
+              <a:rPr lang="en-US" dirty="0" smtClean="0">
+                <a:solidFill>
+                  <a:schemeClr val="accent4">
+                    <a:lumMod val="65000"/>
+                    <a:lumOff val="35000"/>
+                  </a:schemeClr>
+                </a:solidFill>
+              </a:rPr>
+              <a:t>_ _ _ _   </a:t>
+            </a:r>
+            <a:r>
+              <a:rPr lang="en-US" dirty="0" smtClean="0">
+                <a:solidFill>
+                  <a:srgbClr val="00B0F0"/>
+                </a:solidFill>
+              </a:rPr>
+              <a:t>_</a:t>
+            </a:r>
+            <a:r>
               <a:rPr lang="en-US" dirty="0" smtClean="0"/>
-              <a:t>_ _ _ _   _ _ _ _   _ _ _ _   _ _ _ _</a:t>
+              <a:t> </a:t>
+            </a:r>
+            <a:r>
+              <a:rPr lang="en-US" dirty="0" smtClean="0">
+                <a:solidFill>
+                  <a:srgbClr val="7030A0"/>
+                </a:solidFill>
+              </a:rPr>
+              <a:t>_</a:t>
+            </a:r>
+            <a:r>
+              <a:rPr lang="en-US" dirty="0" smtClean="0"/>
+              <a:t> </a:t>
+            </a:r>
+            <a:r>
+              <a:rPr lang="en-US" dirty="0" smtClean="0">
+                <a:solidFill>
+                  <a:srgbClr val="FFC000"/>
+                </a:solidFill>
+              </a:rPr>
+              <a:t>_ _   </a:t>
+            </a:r>
+            <a:r>
+              <a:rPr lang="en-US" dirty="0" smtClean="0">
+                <a:solidFill>
+                  <a:srgbClr val="92D050"/>
+                </a:solidFill>
+              </a:rPr>
+              <a:t>_ _ _ _</a:t>
+            </a:r>
+            <a:endParaRPr lang="en-US" dirty="0">
+              <a:solidFill>
+                <a:srgbClr val="92D050"/>
+              </a:solidFill>
+            </a:endParaRPr>
+          </a:p>
+        </p:txBody>
+      </p:sp>
+      <p:pic>
+        <p:nvPicPr>
+          <p:cNvPr id="2050" name="Picture 2"/>
+          <p:cNvPicPr>
+            <a:picLocks noChangeAspect="1" noChangeArrowheads="1"/>
+          </p:cNvPicPr>
+          <p:nvPr/>
+        </p:nvPicPr>
+        <p:blipFill>
+          <a:blip r:embed="rId2">
+            <a:extLst>
+              <a:ext uri="{28A0092B-C50C-407E-A947-70E740481C1C}">
+                <a14:useLocalDpi xmlns:a14="http://schemas.microsoft.com/office/drawing/2010/main" val="0"/>
+              </a:ext>
+            </a:extLst>
+          </a:blip>
+          <a:srcRect/>
+          <a:stretch>
+            <a:fillRect/>
+          </a:stretch>
+        </p:blipFill>
+        <p:spPr bwMode="auto">
+          <a:xfrm>
+            <a:off x="446641" y="3616935"/>
+            <a:ext cx="2813394" cy="2346543"/>
+          </a:xfrm>
+          <a:prstGeom prst="rect">
+            <a:avLst/>
+          </a:prstGeom>
+          <a:noFill/>
+          <a:ln>
+            <a:noFill/>
+          </a:ln>
+          <a:extLst>
+            <a:ext uri="{909E8E84-426E-40DD-AFC4-6F175D3DCCD1}">
+              <a14:hiddenFill xmlns:a14="http://schemas.microsoft.com/office/drawing/2010/main">
+                <a:solidFill>
+                  <a:schemeClr val="accent1"/>
+                </a:solidFill>
+              </a14:hiddenFill>
+            </a:ext>
+            <a:ext uri="{91240B29-F687-4F45-9708-019B960494DF}">
+              <a14:hiddenLine xmlns:a14="http://schemas.microsoft.com/office/drawing/2010/main" w="9525">
+                <a:solidFill>
+                  <a:schemeClr val="tx1"/>
+                </a:solidFill>
+                <a:miter lim="800000"/>
+                <a:headEnd/>
+                <a:tailEnd/>
+              </a14:hiddenLine>
+            </a:ext>
+          </a:extLst>
+        </p:spPr>
+      </p:pic>
+      <p:sp>
+        <p:nvSpPr>
+          <p:cNvPr id="6" name="TextBox 5"/>
+          <p:cNvSpPr txBox="1"/>
+          <p:nvPr/>
+        </p:nvSpPr>
+        <p:spPr>
+          <a:xfrm>
+            <a:off x="569843" y="6194310"/>
+            <a:ext cx="2584174" cy="461665"/>
+          </a:xfrm>
+          <a:prstGeom prst="rect">
+            <a:avLst/>
+          </a:prstGeom>
+          <a:noFill/>
+        </p:spPr>
+        <p:txBody>
+          <a:bodyPr wrap="square" rtlCol="0">
+            <a:spAutoFit/>
+          </a:bodyPr>
+          <a:lstStyle/>
+          <a:p>
+            <a:r>
+              <a:rPr lang="en-US" dirty="0" smtClean="0"/>
+              <a:t>Fig. 3-12</a:t>
             </a:r>
             <a:endParaRPr lang="en-US" dirty="0"/>
           </a:p>
         </p:txBody>
       </p:sp>
+      <p:sp>
+        <p:nvSpPr>
+          <p:cNvPr id="8" name="Oval 7"/>
+          <p:cNvSpPr/>
+          <p:nvPr/>
+        </p:nvSpPr>
+        <p:spPr bwMode="auto">
+          <a:xfrm>
+            <a:off x="1484242" y="2253950"/>
+            <a:ext cx="914401" cy="766465"/>
+          </a:xfrm>
+          <a:prstGeom prst="ellipse">
+            <a:avLst/>
+          </a:prstGeom>
+          <a:noFill/>
+          <a:ln w="9525" cap="flat" cmpd="sng" algn="ctr">
+            <a:solidFill>
+              <a:srgbClr val="FF0000"/>
+            </a:solidFill>
+            <a:prstDash val="solid"/>
+            <a:round/>
+            <a:headEnd type="none" w="med" len="med"/>
+            <a:tailEnd type="none" w="med" len="med"/>
+          </a:ln>
+          <a:effectLst/>
+        </p:spPr>
+        <p:txBody>
+          <a:bodyPr vert="horz" wrap="square" lIns="91440" tIns="45720" rIns="91440" bIns="45720" numCol="1" rtlCol="0" anchor="t" anchorCtr="0" compatLnSpc="1">
+            <a:prstTxWarp prst="textNoShape">
+              <a:avLst/>
+            </a:prstTxWarp>
+            <a:spAutoFit/>
+          </a:bodyPr>
+          <a:lstStyle/>
+          <a:p>
+            <a:pPr marL="0" marR="0" indent="0" algn="l" defTabSz="914400" rtl="0" eaLnBrk="1" fontAlgn="base" latinLnBrk="0" hangingPunct="1">
+              <a:lnSpc>
+                <a:spcPct val="100000"/>
+              </a:lnSpc>
+              <a:spcBef>
+                <a:spcPct val="50000"/>
+              </a:spcBef>
+              <a:spcAft>
+                <a:spcPct val="0"/>
+              </a:spcAft>
+              <a:buClrTx/>
+              <a:buSzTx/>
+              <a:buFontTx/>
+              <a:buNone/>
+              <a:tabLst/>
+            </a:pPr>
+            <a:endParaRPr kumimoji="0" lang="en-US" sz="2400" b="0" i="0" u="none" strike="noStrike" cap="none" normalizeH="0" baseline="0" smtClean="0">
+              <a:ln>
+                <a:noFill/>
+              </a:ln>
+              <a:solidFill>
+                <a:schemeClr val="tx1"/>
+              </a:solidFill>
+              <a:effectLst/>
+              <a:latin typeface="Times New Roman" pitchFamily="18" charset="0"/>
+              <a:sym typeface="Wingdings" pitchFamily="2" charset="2"/>
+            </a:endParaRPr>
+          </a:p>
+        </p:txBody>
+      </p:sp>
+      <p:cxnSp>
+        <p:nvCxnSpPr>
+          <p:cNvPr id="9" name="Straight Arrow Connector 8"/>
+          <p:cNvCxnSpPr>
+            <a:stCxn id="8" idx="4"/>
+          </p:cNvCxnSpPr>
+          <p:nvPr/>
+        </p:nvCxnSpPr>
+        <p:spPr bwMode="auto">
+          <a:xfrm flipH="1">
+            <a:off x="821635" y="3020415"/>
+            <a:ext cx="1119808" cy="2585255"/>
+          </a:xfrm>
+          <a:prstGeom prst="straightConnector1">
+            <a:avLst/>
+          </a:prstGeom>
+          <a:noFill/>
+          <a:ln w="9525" cap="flat" cmpd="sng" algn="ctr">
+            <a:solidFill>
+              <a:srgbClr val="FF0000"/>
+            </a:solidFill>
+            <a:prstDash val="solid"/>
+            <a:round/>
+            <a:headEnd type="none" w="med" len="med"/>
+            <a:tailEnd type="arrow"/>
+          </a:ln>
+          <a:effectLst/>
+        </p:spPr>
+      </p:cxnSp>
+      <p:sp>
+        <p:nvSpPr>
+          <p:cNvPr id="12" name="TextBox 11"/>
+          <p:cNvSpPr txBox="1"/>
+          <p:nvPr/>
+        </p:nvSpPr>
+        <p:spPr>
+          <a:xfrm>
+            <a:off x="1381539" y="813928"/>
+            <a:ext cx="1934817" cy="461665"/>
+          </a:xfrm>
+          <a:prstGeom prst="rect">
+            <a:avLst/>
+          </a:prstGeom>
+          <a:noFill/>
+        </p:spPr>
+        <p:txBody>
+          <a:bodyPr wrap="square" rtlCol="0">
+            <a:spAutoFit/>
+          </a:bodyPr>
+          <a:lstStyle/>
+          <a:p>
+            <a:r>
+              <a:rPr lang="en-US" dirty="0" smtClean="0">
+                <a:solidFill>
+                  <a:srgbClr val="7030A0"/>
+                </a:solidFill>
+              </a:rPr>
+              <a:t>no .b</a:t>
+            </a:r>
+            <a:endParaRPr lang="en-US" dirty="0">
+              <a:solidFill>
+                <a:srgbClr val="7030A0"/>
+              </a:solidFill>
+            </a:endParaRPr>
+          </a:p>
+        </p:txBody>
+      </p:sp>
+      <p:sp>
+        <p:nvSpPr>
+          <p:cNvPr id="13" name="Oval 12"/>
+          <p:cNvSpPr/>
+          <p:nvPr/>
+        </p:nvSpPr>
+        <p:spPr bwMode="auto">
+          <a:xfrm>
+            <a:off x="5788219" y="2276634"/>
+            <a:ext cx="890876" cy="600169"/>
+          </a:xfrm>
+          <a:prstGeom prst="ellipse">
+            <a:avLst/>
+          </a:prstGeom>
+          <a:noFill/>
+          <a:ln w="9525" cap="flat" cmpd="sng" algn="ctr">
+            <a:solidFill>
+              <a:srgbClr val="7030A0"/>
+            </a:solidFill>
+            <a:prstDash val="solid"/>
+            <a:round/>
+            <a:headEnd type="none" w="med" len="med"/>
+            <a:tailEnd type="none" w="med" len="med"/>
+          </a:ln>
+          <a:effectLst/>
+        </p:spPr>
+        <p:txBody>
+          <a:bodyPr vert="horz" wrap="square" lIns="91440" tIns="45720" rIns="91440" bIns="45720" numCol="1" rtlCol="0" anchor="t" anchorCtr="0" compatLnSpc="1">
+            <a:prstTxWarp prst="textNoShape">
+              <a:avLst/>
+            </a:prstTxWarp>
+            <a:spAutoFit/>
+          </a:bodyPr>
+          <a:lstStyle/>
+          <a:p>
+            <a:pPr marL="0" marR="0" indent="0" algn="l" defTabSz="914400" rtl="0" eaLnBrk="1" fontAlgn="base" latinLnBrk="0" hangingPunct="1">
+              <a:lnSpc>
+                <a:spcPct val="100000"/>
+              </a:lnSpc>
+              <a:spcBef>
+                <a:spcPct val="50000"/>
+              </a:spcBef>
+              <a:spcAft>
+                <a:spcPct val="0"/>
+              </a:spcAft>
+              <a:buClrTx/>
+              <a:buSzTx/>
+              <a:buFontTx/>
+              <a:buNone/>
+              <a:tabLst/>
+            </a:pPr>
+            <a:endParaRPr kumimoji="0" lang="en-US" sz="2400" b="0" i="0" u="none" strike="noStrike" cap="none" normalizeH="0" baseline="0" smtClean="0">
+              <a:ln>
+                <a:noFill/>
+              </a:ln>
+              <a:solidFill>
+                <a:schemeClr val="tx1"/>
+              </a:solidFill>
+              <a:effectLst/>
+              <a:latin typeface="Times New Roman" pitchFamily="18" charset="0"/>
+              <a:sym typeface="Wingdings" pitchFamily="2" charset="2"/>
+            </a:endParaRPr>
+          </a:p>
+        </p:txBody>
+      </p:sp>
+      <p:cxnSp>
+        <p:nvCxnSpPr>
+          <p:cNvPr id="14" name="Straight Arrow Connector 13"/>
+          <p:cNvCxnSpPr/>
+          <p:nvPr/>
+        </p:nvCxnSpPr>
+        <p:spPr bwMode="auto">
+          <a:xfrm flipH="1" flipV="1">
+            <a:off x="2348947" y="1044760"/>
+            <a:ext cx="3884710" cy="1231874"/>
+          </a:xfrm>
+          <a:prstGeom prst="straightConnector1">
+            <a:avLst/>
+          </a:prstGeom>
+          <a:noFill/>
+          <a:ln w="9525" cap="flat" cmpd="sng" algn="ctr">
+            <a:solidFill>
+              <a:srgbClr val="7030A0"/>
+            </a:solidFill>
+            <a:prstDash val="solid"/>
+            <a:round/>
+            <a:headEnd type="none" w="med" len="med"/>
+            <a:tailEnd type="arrow"/>
+          </a:ln>
+          <a:effectLst/>
+        </p:spPr>
+      </p:cxnSp>
+      <p:cxnSp>
+        <p:nvCxnSpPr>
+          <p:cNvPr id="15" name="Straight Arrow Connector 14"/>
+          <p:cNvCxnSpPr/>
+          <p:nvPr/>
+        </p:nvCxnSpPr>
+        <p:spPr bwMode="auto">
+          <a:xfrm>
+            <a:off x="6233657" y="2876803"/>
+            <a:ext cx="445438" cy="3086675"/>
+          </a:xfrm>
+          <a:prstGeom prst="straightConnector1">
+            <a:avLst/>
+          </a:prstGeom>
+          <a:noFill/>
+          <a:ln w="9525" cap="flat" cmpd="sng" algn="ctr">
+            <a:solidFill>
+              <a:srgbClr val="7030A0"/>
+            </a:solidFill>
+            <a:prstDash val="solid"/>
+            <a:round/>
+            <a:headEnd type="none" w="med" len="med"/>
+            <a:tailEnd type="arrow"/>
+          </a:ln>
+          <a:effectLst/>
+        </p:spPr>
+      </p:cxnSp>
+      <p:sp>
+        <p:nvSpPr>
+          <p:cNvPr id="20" name="TextBox 19"/>
+          <p:cNvSpPr txBox="1"/>
+          <p:nvPr/>
+        </p:nvSpPr>
+        <p:spPr>
+          <a:xfrm>
+            <a:off x="5976730" y="1044760"/>
+            <a:ext cx="2239618" cy="461665"/>
+          </a:xfrm>
+          <a:prstGeom prst="rect">
+            <a:avLst/>
+          </a:prstGeom>
+          <a:noFill/>
+        </p:spPr>
+        <p:txBody>
+          <a:bodyPr wrap="square" rtlCol="0">
+            <a:spAutoFit/>
+          </a:bodyPr>
+          <a:lstStyle/>
+          <a:p>
+            <a:r>
+              <a:rPr lang="en-US" dirty="0">
+                <a:solidFill>
+                  <a:srgbClr val="0070C0"/>
+                </a:solidFill>
+              </a:rPr>
+              <a:t>r</a:t>
+            </a:r>
+            <a:r>
+              <a:rPr lang="en-US" dirty="0" smtClean="0">
+                <a:solidFill>
+                  <a:srgbClr val="0070C0"/>
+                </a:solidFill>
+              </a:rPr>
+              <a:t>egister mode</a:t>
+            </a:r>
+            <a:endParaRPr lang="en-US" dirty="0">
+              <a:solidFill>
+                <a:srgbClr val="0070C0"/>
+              </a:solidFill>
+            </a:endParaRPr>
+          </a:p>
+        </p:txBody>
+      </p:sp>
+      <p:sp>
+        <p:nvSpPr>
+          <p:cNvPr id="21" name="Oval 20"/>
+          <p:cNvSpPr/>
+          <p:nvPr/>
+        </p:nvSpPr>
+        <p:spPr bwMode="auto">
+          <a:xfrm>
+            <a:off x="5211749" y="2253950"/>
+            <a:ext cx="576470" cy="600169"/>
+          </a:xfrm>
+          <a:prstGeom prst="ellipse">
+            <a:avLst/>
+          </a:prstGeom>
+          <a:noFill/>
+          <a:ln w="9525" cap="flat" cmpd="sng" algn="ctr">
+            <a:solidFill>
+              <a:srgbClr val="0070C0"/>
+            </a:solidFill>
+            <a:prstDash val="solid"/>
+            <a:round/>
+            <a:headEnd type="none" w="med" len="med"/>
+            <a:tailEnd type="none" w="med" len="med"/>
+          </a:ln>
+          <a:effectLst/>
+        </p:spPr>
+        <p:txBody>
+          <a:bodyPr vert="horz" wrap="square" lIns="91440" tIns="45720" rIns="91440" bIns="45720" numCol="1" rtlCol="0" anchor="t" anchorCtr="0" compatLnSpc="1">
+            <a:prstTxWarp prst="textNoShape">
+              <a:avLst/>
+            </a:prstTxWarp>
+            <a:spAutoFit/>
+          </a:bodyPr>
+          <a:lstStyle/>
+          <a:p>
+            <a:pPr marL="0" marR="0" indent="0" algn="l" defTabSz="914400" rtl="0" eaLnBrk="1" fontAlgn="base" latinLnBrk="0" hangingPunct="1">
+              <a:lnSpc>
+                <a:spcPct val="100000"/>
+              </a:lnSpc>
+              <a:spcBef>
+                <a:spcPct val="50000"/>
+              </a:spcBef>
+              <a:spcAft>
+                <a:spcPct val="0"/>
+              </a:spcAft>
+              <a:buClrTx/>
+              <a:buSzTx/>
+              <a:buFontTx/>
+              <a:buNone/>
+              <a:tabLst/>
+            </a:pPr>
+            <a:endParaRPr kumimoji="0" lang="en-US" sz="2400" b="0" i="0" u="none" strike="noStrike" cap="none" normalizeH="0" baseline="0" smtClean="0">
+              <a:ln>
+                <a:noFill/>
+              </a:ln>
+              <a:solidFill>
+                <a:schemeClr val="tx1"/>
+              </a:solidFill>
+              <a:effectLst/>
+              <a:latin typeface="Times New Roman" pitchFamily="18" charset="0"/>
+              <a:sym typeface="Wingdings" pitchFamily="2" charset="2"/>
+            </a:endParaRPr>
+          </a:p>
+        </p:txBody>
+      </p:sp>
+      <p:cxnSp>
+        <p:nvCxnSpPr>
+          <p:cNvPr id="22" name="Straight Arrow Connector 21"/>
+          <p:cNvCxnSpPr/>
+          <p:nvPr/>
+        </p:nvCxnSpPr>
+        <p:spPr bwMode="auto">
+          <a:xfrm>
+            <a:off x="5499984" y="2862470"/>
+            <a:ext cx="956392" cy="3101008"/>
+          </a:xfrm>
+          <a:prstGeom prst="straightConnector1">
+            <a:avLst/>
+          </a:prstGeom>
+          <a:noFill/>
+          <a:ln w="9525" cap="flat" cmpd="sng" algn="ctr">
+            <a:solidFill>
+              <a:srgbClr val="0070C0"/>
+            </a:solidFill>
+            <a:prstDash val="solid"/>
+            <a:round/>
+            <a:headEnd type="none" w="med" len="med"/>
+            <a:tailEnd type="arrow"/>
+          </a:ln>
+          <a:effectLst/>
+        </p:spPr>
+      </p:cxnSp>
+      <p:cxnSp>
+        <p:nvCxnSpPr>
+          <p:cNvPr id="23" name="Straight Arrow Connector 22"/>
+          <p:cNvCxnSpPr>
+            <a:stCxn id="21" idx="0"/>
+          </p:cNvCxnSpPr>
+          <p:nvPr/>
+        </p:nvCxnSpPr>
+        <p:spPr bwMode="auto">
+          <a:xfrm flipV="1">
+            <a:off x="5499984" y="1506425"/>
+            <a:ext cx="476746" cy="747525"/>
+          </a:xfrm>
+          <a:prstGeom prst="straightConnector1">
+            <a:avLst/>
+          </a:prstGeom>
+          <a:noFill/>
+          <a:ln w="9525" cap="flat" cmpd="sng" algn="ctr">
+            <a:solidFill>
+              <a:srgbClr val="0070C0"/>
+            </a:solidFill>
+            <a:prstDash val="solid"/>
+            <a:round/>
+            <a:headEnd type="none" w="med" len="med"/>
+            <a:tailEnd type="arrow"/>
+          </a:ln>
+          <a:effectLst/>
+        </p:spPr>
+      </p:cxnSp>
+      <p:cxnSp>
+        <p:nvCxnSpPr>
+          <p:cNvPr id="26" name="Straight Arrow Connector 25"/>
+          <p:cNvCxnSpPr/>
+          <p:nvPr/>
+        </p:nvCxnSpPr>
+        <p:spPr bwMode="auto">
+          <a:xfrm flipH="1">
+            <a:off x="3048000" y="1307329"/>
+            <a:ext cx="2886624" cy="353368"/>
+          </a:xfrm>
+          <a:prstGeom prst="straightConnector1">
+            <a:avLst/>
+          </a:prstGeom>
+          <a:noFill/>
+          <a:ln w="9525" cap="flat" cmpd="sng" algn="ctr">
+            <a:solidFill>
+              <a:srgbClr val="0070C0"/>
+            </a:solidFill>
+            <a:prstDash val="solid"/>
+            <a:round/>
+            <a:headEnd type="none" w="med" len="med"/>
+            <a:tailEnd type="arrow"/>
+          </a:ln>
+          <a:effectLst/>
+        </p:spPr>
+      </p:cxnSp>
+      <p:cxnSp>
+        <p:nvCxnSpPr>
+          <p:cNvPr id="30" name="Straight Arrow Connector 29"/>
+          <p:cNvCxnSpPr/>
+          <p:nvPr/>
+        </p:nvCxnSpPr>
+        <p:spPr bwMode="auto">
+          <a:xfrm>
+            <a:off x="2120348" y="3020415"/>
+            <a:ext cx="2170954" cy="2737655"/>
+          </a:xfrm>
+          <a:prstGeom prst="straightConnector1">
+            <a:avLst/>
+          </a:prstGeom>
+          <a:noFill/>
+          <a:ln w="9525" cap="flat" cmpd="sng" algn="ctr">
+            <a:solidFill>
+              <a:srgbClr val="FF0000"/>
+            </a:solidFill>
+            <a:prstDash val="solid"/>
+            <a:round/>
+            <a:headEnd type="none" w="med" len="med"/>
+            <a:tailEnd type="arrow"/>
+          </a:ln>
+          <a:effectLst/>
+        </p:spPr>
+      </p:cxnSp>
+      <p:sp>
+        <p:nvSpPr>
+          <p:cNvPr id="34" name="Oval 33"/>
+          <p:cNvSpPr/>
+          <p:nvPr/>
+        </p:nvSpPr>
+        <p:spPr bwMode="auto">
+          <a:xfrm>
+            <a:off x="7275444" y="2170801"/>
+            <a:ext cx="1033669" cy="766465"/>
+          </a:xfrm>
+          <a:prstGeom prst="ellipse">
+            <a:avLst/>
+          </a:prstGeom>
+          <a:noFill/>
+          <a:ln w="9525" cap="flat" cmpd="sng" algn="ctr">
+            <a:solidFill>
+              <a:srgbClr val="00B050"/>
+            </a:solidFill>
+            <a:prstDash val="solid"/>
+            <a:round/>
+            <a:headEnd type="none" w="med" len="med"/>
+            <a:tailEnd type="none" w="med" len="med"/>
+          </a:ln>
+          <a:effectLst/>
+        </p:spPr>
+        <p:txBody>
+          <a:bodyPr vert="horz" wrap="square" lIns="91440" tIns="45720" rIns="91440" bIns="45720" numCol="1" rtlCol="0" anchor="t" anchorCtr="0" compatLnSpc="1">
+            <a:prstTxWarp prst="textNoShape">
+              <a:avLst/>
+            </a:prstTxWarp>
+            <a:spAutoFit/>
+          </a:bodyPr>
+          <a:lstStyle/>
+          <a:p>
+            <a:pPr marL="0" marR="0" indent="0" algn="l" defTabSz="914400" rtl="0" eaLnBrk="1" fontAlgn="base" latinLnBrk="0" hangingPunct="1">
+              <a:lnSpc>
+                <a:spcPct val="100000"/>
+              </a:lnSpc>
+              <a:spcBef>
+                <a:spcPct val="50000"/>
+              </a:spcBef>
+              <a:spcAft>
+                <a:spcPct val="0"/>
+              </a:spcAft>
+              <a:buClrTx/>
+              <a:buSzTx/>
+              <a:buFontTx/>
+              <a:buNone/>
+              <a:tabLst/>
+            </a:pPr>
+            <a:endParaRPr kumimoji="0" lang="en-US" sz="2400" b="0" i="0" u="none" strike="noStrike" cap="none" normalizeH="0" baseline="0" smtClean="0">
+              <a:ln>
+                <a:noFill/>
+              </a:ln>
+              <a:solidFill>
+                <a:schemeClr val="tx1"/>
+              </a:solidFill>
+              <a:effectLst/>
+              <a:latin typeface="Times New Roman" pitchFamily="18" charset="0"/>
+              <a:sym typeface="Wingdings" pitchFamily="2" charset="2"/>
+            </a:endParaRPr>
+          </a:p>
+        </p:txBody>
+      </p:sp>
+      <p:cxnSp>
+        <p:nvCxnSpPr>
+          <p:cNvPr id="35" name="Straight Arrow Connector 34"/>
+          <p:cNvCxnSpPr/>
+          <p:nvPr/>
+        </p:nvCxnSpPr>
+        <p:spPr bwMode="auto">
+          <a:xfrm>
+            <a:off x="7792278" y="2937266"/>
+            <a:ext cx="0" cy="3026212"/>
+          </a:xfrm>
+          <a:prstGeom prst="straightConnector1">
+            <a:avLst/>
+          </a:prstGeom>
+          <a:noFill/>
+          <a:ln w="9525" cap="flat" cmpd="sng" algn="ctr">
+            <a:solidFill>
+              <a:srgbClr val="00B050"/>
+            </a:solidFill>
+            <a:prstDash val="solid"/>
+            <a:round/>
+            <a:headEnd type="none" w="med" len="med"/>
+            <a:tailEnd type="arrow"/>
+          </a:ln>
+          <a:effectLst/>
+        </p:spPr>
+      </p:cxnSp>
+      <p:cxnSp>
+        <p:nvCxnSpPr>
+          <p:cNvPr id="37" name="Straight Arrow Connector 36"/>
+          <p:cNvCxnSpPr/>
+          <p:nvPr/>
+        </p:nvCxnSpPr>
+        <p:spPr bwMode="auto">
+          <a:xfrm flipH="1" flipV="1">
+            <a:off x="3048000" y="1762539"/>
+            <a:ext cx="4651513" cy="408262"/>
+          </a:xfrm>
+          <a:prstGeom prst="straightConnector1">
+            <a:avLst/>
+          </a:prstGeom>
+          <a:noFill/>
+          <a:ln w="9525" cap="flat" cmpd="sng" algn="ctr">
+            <a:solidFill>
+              <a:srgbClr val="00B050"/>
+            </a:solidFill>
+            <a:prstDash val="solid"/>
+            <a:round/>
+            <a:headEnd type="none" w="med" len="med"/>
+            <a:tailEnd type="arrow"/>
+          </a:ln>
+          <a:effectLst/>
+        </p:spPr>
+      </p:cxnSp>
+      <p:sp>
+        <p:nvSpPr>
+          <p:cNvPr id="2053" name="TextBox 2052"/>
+          <p:cNvSpPr txBox="1"/>
+          <p:nvPr/>
+        </p:nvSpPr>
+        <p:spPr>
+          <a:xfrm>
+            <a:off x="3316357" y="3616935"/>
+            <a:ext cx="2422000" cy="830997"/>
+          </a:xfrm>
+          <a:prstGeom prst="rect">
+            <a:avLst/>
+          </a:prstGeom>
+          <a:noFill/>
+        </p:spPr>
+        <p:txBody>
+          <a:bodyPr wrap="square" rtlCol="0">
+            <a:spAutoFit/>
+          </a:bodyPr>
+          <a:lstStyle/>
+          <a:p>
+            <a:r>
+              <a:rPr lang="en-US" dirty="0">
+                <a:solidFill>
+                  <a:srgbClr val="FFC000"/>
+                </a:solidFill>
+              </a:rPr>
+              <a:t>i</a:t>
+            </a:r>
+            <a:r>
+              <a:rPr lang="en-US" dirty="0" smtClean="0">
+                <a:solidFill>
+                  <a:srgbClr val="FFC000"/>
+                </a:solidFill>
+              </a:rPr>
+              <a:t>ndirect register mode</a:t>
+            </a:r>
+            <a:endParaRPr lang="en-US" dirty="0">
+              <a:solidFill>
+                <a:srgbClr val="FFC000"/>
+              </a:solidFill>
+            </a:endParaRPr>
+          </a:p>
+        </p:txBody>
+      </p:sp>
+      <p:sp>
+        <p:nvSpPr>
+          <p:cNvPr id="2054" name="Oval 2053"/>
+          <p:cNvSpPr/>
+          <p:nvPr/>
+        </p:nvSpPr>
+        <p:spPr bwMode="auto">
+          <a:xfrm>
+            <a:off x="6679095" y="2276634"/>
+            <a:ext cx="417444" cy="466566"/>
+          </a:xfrm>
+          <a:prstGeom prst="ellipse">
+            <a:avLst/>
+          </a:prstGeom>
+          <a:noFill/>
+          <a:ln w="9525" cap="flat" cmpd="sng" algn="ctr">
+            <a:solidFill>
+              <a:srgbClr val="FFC000"/>
+            </a:solidFill>
+            <a:prstDash val="solid"/>
+            <a:round/>
+            <a:headEnd type="none" w="med" len="med"/>
+            <a:tailEnd type="none" w="med" len="med"/>
+          </a:ln>
+          <a:effectLst/>
+        </p:spPr>
+        <p:txBody>
+          <a:bodyPr vert="horz" wrap="square" lIns="91440" tIns="45720" rIns="91440" bIns="45720" numCol="1" rtlCol="0" anchor="t" anchorCtr="0" compatLnSpc="1">
+            <a:prstTxWarp prst="textNoShape">
+              <a:avLst/>
+            </a:prstTxWarp>
+            <a:spAutoFit/>
+          </a:bodyPr>
+          <a:lstStyle/>
+          <a:p>
+            <a:pPr marL="0" marR="0" indent="0" algn="l" defTabSz="914400" rtl="0" eaLnBrk="1" fontAlgn="base" latinLnBrk="0" hangingPunct="1">
+              <a:lnSpc>
+                <a:spcPct val="100000"/>
+              </a:lnSpc>
+              <a:spcBef>
+                <a:spcPct val="50000"/>
+              </a:spcBef>
+              <a:spcAft>
+                <a:spcPct val="0"/>
+              </a:spcAft>
+              <a:buClrTx/>
+              <a:buSzTx/>
+              <a:buFontTx/>
+              <a:buNone/>
+              <a:tabLst/>
+            </a:pPr>
+            <a:endParaRPr kumimoji="0" lang="en-US" sz="2400" b="0" i="0" u="none" strike="noStrike" cap="none" normalizeH="0" baseline="0" smtClean="0">
+              <a:ln>
+                <a:noFill/>
+              </a:ln>
+              <a:solidFill>
+                <a:schemeClr val="tx1"/>
+              </a:solidFill>
+              <a:effectLst/>
+              <a:latin typeface="Times New Roman" pitchFamily="18" charset="0"/>
+              <a:sym typeface="Wingdings" pitchFamily="2" charset="2"/>
+            </a:endParaRPr>
+          </a:p>
+        </p:txBody>
+      </p:sp>
+      <p:cxnSp>
+        <p:nvCxnSpPr>
+          <p:cNvPr id="2056" name="Straight Arrow Connector 2055"/>
+          <p:cNvCxnSpPr>
+            <a:stCxn id="2054" idx="4"/>
+          </p:cNvCxnSpPr>
+          <p:nvPr/>
+        </p:nvCxnSpPr>
+        <p:spPr bwMode="auto">
+          <a:xfrm>
+            <a:off x="6887817" y="2743200"/>
+            <a:ext cx="208722" cy="3220278"/>
+          </a:xfrm>
+          <a:prstGeom prst="straightConnector1">
+            <a:avLst/>
+          </a:prstGeom>
+          <a:noFill/>
+          <a:ln w="9525" cap="flat" cmpd="sng" algn="ctr">
+            <a:solidFill>
+              <a:srgbClr val="FFC000"/>
+            </a:solidFill>
+            <a:prstDash val="solid"/>
+            <a:round/>
+            <a:headEnd type="none" w="med" len="med"/>
+            <a:tailEnd type="arrow"/>
+          </a:ln>
+          <a:effectLst/>
+        </p:spPr>
+      </p:cxnSp>
+      <p:cxnSp>
+        <p:nvCxnSpPr>
+          <p:cNvPr id="2058" name="Straight Arrow Connector 2057"/>
+          <p:cNvCxnSpPr/>
+          <p:nvPr/>
+        </p:nvCxnSpPr>
+        <p:spPr bwMode="auto">
+          <a:xfrm flipH="1" flipV="1">
+            <a:off x="2348947" y="1880187"/>
+            <a:ext cx="4538871" cy="396447"/>
+          </a:xfrm>
+          <a:prstGeom prst="straightConnector1">
+            <a:avLst/>
+          </a:prstGeom>
+          <a:noFill/>
+          <a:ln w="9525" cap="flat" cmpd="sng" algn="ctr">
+            <a:solidFill>
+              <a:srgbClr val="FFC000"/>
+            </a:solidFill>
+            <a:prstDash val="solid"/>
+            <a:round/>
+            <a:headEnd type="none" w="med" len="med"/>
+            <a:tailEnd type="arrow"/>
+          </a:ln>
+          <a:effectLst/>
+        </p:spPr>
+      </p:cxnSp>
+      <p:cxnSp>
+        <p:nvCxnSpPr>
+          <p:cNvPr id="2061" name="Straight Arrow Connector 2060"/>
+          <p:cNvCxnSpPr>
+            <a:stCxn id="2054" idx="3"/>
+            <a:endCxn id="2053" idx="0"/>
+          </p:cNvCxnSpPr>
+          <p:nvPr/>
+        </p:nvCxnSpPr>
+        <p:spPr bwMode="auto">
+          <a:xfrm flipH="1">
+            <a:off x="4527357" y="2674873"/>
+            <a:ext cx="2212871" cy="942062"/>
+          </a:xfrm>
+          <a:prstGeom prst="straightConnector1">
+            <a:avLst/>
+          </a:prstGeom>
+          <a:noFill/>
+          <a:ln w="9525" cap="flat" cmpd="sng" algn="ctr">
+            <a:solidFill>
+              <a:srgbClr val="FFC000"/>
+            </a:solidFill>
+            <a:prstDash val="solid"/>
+            <a:round/>
+            <a:headEnd type="none" w="med" len="med"/>
+            <a:tailEnd type="arrow"/>
+          </a:ln>
+          <a:effectLst/>
+        </p:spPr>
+      </p:cxnSp>
+      <p:cxnSp>
+        <p:nvCxnSpPr>
+          <p:cNvPr id="49" name="Straight Arrow Connector 48"/>
+          <p:cNvCxnSpPr/>
+          <p:nvPr/>
+        </p:nvCxnSpPr>
+        <p:spPr bwMode="auto">
+          <a:xfrm flipH="1">
+            <a:off x="1484243" y="1307329"/>
+            <a:ext cx="172279" cy="353369"/>
+          </a:xfrm>
+          <a:prstGeom prst="straightConnector1">
+            <a:avLst/>
+          </a:prstGeom>
+          <a:noFill/>
+          <a:ln w="9525" cap="flat" cmpd="sng" algn="ctr">
+            <a:solidFill>
+              <a:srgbClr val="7030A0"/>
+            </a:solidFill>
+            <a:prstDash val="solid"/>
+            <a:round/>
+            <a:headEnd type="none" w="med" len="med"/>
+            <a:tailEnd type="arrow"/>
+          </a:ln>
+          <a:effectLst/>
+        </p:spPr>
+      </p:cxnSp>
+      <p:sp>
+        <p:nvSpPr>
+          <p:cNvPr id="2064" name="Oval 2063"/>
+          <p:cNvSpPr/>
+          <p:nvPr/>
+        </p:nvSpPr>
+        <p:spPr bwMode="auto">
+          <a:xfrm>
+            <a:off x="3316356" y="2276634"/>
+            <a:ext cx="1174956" cy="466566"/>
+          </a:xfrm>
+          <a:prstGeom prst="ellipse">
+            <a:avLst/>
+          </a:prstGeom>
+          <a:noFill/>
+          <a:ln w="9525" cap="flat" cmpd="sng" algn="ctr">
+            <a:solidFill>
+              <a:schemeClr val="accent4">
+                <a:lumMod val="65000"/>
+                <a:lumOff val="35000"/>
+              </a:schemeClr>
+            </a:solidFill>
+            <a:prstDash val="solid"/>
+            <a:round/>
+            <a:headEnd type="none" w="med" len="med"/>
+            <a:tailEnd type="none" w="med" len="med"/>
+          </a:ln>
+          <a:effectLst/>
+        </p:spPr>
+        <p:txBody>
+          <a:bodyPr vert="horz" wrap="square" lIns="91440" tIns="45720" rIns="91440" bIns="45720" numCol="1" rtlCol="0" anchor="t" anchorCtr="0" compatLnSpc="1">
+            <a:prstTxWarp prst="textNoShape">
+              <a:avLst/>
+            </a:prstTxWarp>
+            <a:spAutoFit/>
+          </a:bodyPr>
+          <a:lstStyle/>
+          <a:p>
+            <a:pPr marL="0" marR="0" indent="0" algn="l" defTabSz="914400" rtl="0" eaLnBrk="1" fontAlgn="base" latinLnBrk="0" hangingPunct="1">
+              <a:lnSpc>
+                <a:spcPct val="100000"/>
+              </a:lnSpc>
+              <a:spcBef>
+                <a:spcPct val="50000"/>
+              </a:spcBef>
+              <a:spcAft>
+                <a:spcPct val="0"/>
+              </a:spcAft>
+              <a:buClrTx/>
+              <a:buSzTx/>
+              <a:buFontTx/>
+              <a:buNone/>
+              <a:tabLst/>
+            </a:pPr>
+            <a:endParaRPr kumimoji="0" lang="en-US" sz="2400" b="0" i="0" u="none" strike="noStrike" cap="none" normalizeH="0" baseline="0" smtClean="0">
+              <a:ln>
+                <a:noFill/>
+              </a:ln>
+              <a:solidFill>
+                <a:schemeClr val="tx1"/>
+              </a:solidFill>
+              <a:effectLst/>
+              <a:latin typeface="Times New Roman" pitchFamily="18" charset="0"/>
+              <a:sym typeface="Wingdings" pitchFamily="2" charset="2"/>
+            </a:endParaRPr>
+          </a:p>
+        </p:txBody>
+      </p:sp>
+      <p:cxnSp>
+        <p:nvCxnSpPr>
+          <p:cNvPr id="2066" name="Straight Arrow Connector 2065"/>
+          <p:cNvCxnSpPr>
+            <a:stCxn id="2064" idx="1"/>
+          </p:cNvCxnSpPr>
+          <p:nvPr/>
+        </p:nvCxnSpPr>
+        <p:spPr bwMode="auto">
+          <a:xfrm flipH="1" flipV="1">
+            <a:off x="2120348" y="1880187"/>
+            <a:ext cx="1368076" cy="464774"/>
+          </a:xfrm>
+          <a:prstGeom prst="straightConnector1">
+            <a:avLst/>
+          </a:prstGeom>
+          <a:noFill/>
+          <a:ln w="9525" cap="flat" cmpd="sng" algn="ctr">
+            <a:solidFill>
+              <a:schemeClr val="accent4">
+                <a:lumMod val="65000"/>
+                <a:lumOff val="35000"/>
+              </a:schemeClr>
+            </a:solidFill>
+            <a:prstDash val="solid"/>
+            <a:round/>
+            <a:headEnd type="none" w="med" len="med"/>
+            <a:tailEnd type="arrow"/>
+          </a:ln>
+          <a:effectLst/>
+        </p:spPr>
+      </p:cxnSp>
+      <p:cxnSp>
+        <p:nvCxnSpPr>
+          <p:cNvPr id="2068" name="Straight Arrow Connector 2067"/>
+          <p:cNvCxnSpPr>
+            <a:stCxn id="2064" idx="4"/>
+          </p:cNvCxnSpPr>
+          <p:nvPr/>
+        </p:nvCxnSpPr>
+        <p:spPr bwMode="auto">
+          <a:xfrm>
+            <a:off x="3903834" y="2743200"/>
+            <a:ext cx="1596150" cy="3127513"/>
+          </a:xfrm>
+          <a:prstGeom prst="straightConnector1">
+            <a:avLst/>
+          </a:prstGeom>
+          <a:noFill/>
+          <a:ln w="9525" cap="flat" cmpd="sng" algn="ctr">
+            <a:solidFill>
+              <a:schemeClr val="accent4">
+                <a:lumMod val="65000"/>
+                <a:lumOff val="35000"/>
+              </a:schemeClr>
+            </a:solidFill>
+            <a:prstDash val="solid"/>
+            <a:round/>
+            <a:headEnd type="none" w="med" len="med"/>
+            <a:tailEnd type="arrow"/>
+          </a:ln>
+          <a:effectLst/>
+        </p:spPr>
+      </p:cxnSp>
     </p:spTree>
     <p:extLst>
       <p:ext uri="{BB962C8B-B14F-4D97-AF65-F5344CB8AC3E}">

</xml_diff>